<commit_message>
Izmenil 6 slaid presentacii
</commit_message>
<xml_diff>
--- a/docs/MIND-MAPS.pptx
+++ b/docs/MIND-MAPS.pptx
@@ -5809,28 +5809,22 @@
       </p:sp>
       <p:pic>
         <p:nvPicPr>
-          <p:cNvPr id="2" name="Рисунок 1"/>
+          <p:cNvPr id="3" name="Рисунок 2"/>
           <p:cNvPicPr>
             <a:picLocks noChangeAspect="1"/>
           </p:cNvPicPr>
           <p:nvPr/>
         </p:nvPicPr>
         <p:blipFill>
-          <a:blip r:embed="rId3">
-            <a:extLst>
-              <a:ext uri="{28A0092B-C50C-407E-A947-70E740481C1C}">
-                <a14:useLocalDpi xmlns:a14="http://schemas.microsoft.com/office/drawing/2010/main" val="0"/>
-              </a:ext>
-            </a:extLst>
-          </a:blip>
+          <a:blip r:embed="rId3"/>
           <a:stretch>
             <a:fillRect/>
           </a:stretch>
         </p:blipFill>
         <p:spPr>
           <a:xfrm>
-            <a:off x="0" y="1156919"/>
-            <a:ext cx="6858000" cy="2829662"/>
+            <a:off x="136967" y="1645255"/>
+            <a:ext cx="6584065" cy="2011270"/>
           </a:xfrm>
           <a:prstGeom prst="rect">
             <a:avLst/>

</xml_diff>